<commit_message>
a prototype for final: vine growth
</commit_message>
<xml_diff>
--- a/JiayiHao_ActualMidterm/Jiayi Mediart 206 Presentation.pptx
+++ b/JiayiHao_ActualMidterm/Jiayi Mediart 206 Presentation.pptx
@@ -5,7 +5,7 @@
     <p:sldMasterId id="2147483659" r:id="rId1"/>
   </p:sldMasterIdLst>
   <p:notesMasterIdLst>
-    <p:notesMasterId r:id="rId10"/>
+    <p:notesMasterId r:id="rId11"/>
   </p:notesMasterIdLst>
   <p:sldIdLst>
     <p:sldId id="256" r:id="rId2"/>
@@ -15,24 +15,25 @@
     <p:sldId id="260" r:id="rId6"/>
     <p:sldId id="261" r:id="rId7"/>
     <p:sldId id="262" r:id="rId8"/>
-    <p:sldId id="263" r:id="rId9"/>
+    <p:sldId id="264" r:id="rId9"/>
+    <p:sldId id="263" r:id="rId10"/>
   </p:sldIdLst>
   <p:sldSz cx="9144000" cy="5143500" type="screen16x9"/>
   <p:notesSz cx="6858000" cy="9144000"/>
   <p:embeddedFontLst>
     <p:embeddedFont>
       <p:font typeface="Lato" panose="020F0302020204030203" pitchFamily="34" charset="77"/>
-      <p:regular r:id="rId11"/>
-      <p:bold r:id="rId12"/>
-      <p:italic r:id="rId13"/>
-      <p:boldItalic r:id="rId14"/>
+      <p:regular r:id="rId12"/>
+      <p:bold r:id="rId13"/>
+      <p:italic r:id="rId14"/>
+      <p:boldItalic r:id="rId15"/>
     </p:embeddedFont>
     <p:embeddedFont>
       <p:font typeface="Raleway" pitchFamily="2" charset="77"/>
-      <p:regular r:id="rId15"/>
-      <p:bold r:id="rId16"/>
-      <p:italic r:id="rId17"/>
-      <p:boldItalic r:id="rId18"/>
+      <p:regular r:id="rId16"/>
+      <p:bold r:id="rId17"/>
+      <p:italic r:id="rId18"/>
+      <p:boldItalic r:id="rId19"/>
     </p:embeddedFont>
   </p:embeddedFontLst>
   <p:defaultTextStyle>
@@ -753,8 +754,8 @@
         </p:nvSpPr>
         <p:spPr>
           <a:xfrm>
-            <a:off x="381300" y="685800"/>
-            <a:ext cx="6096075" cy="3429000"/>
+            <a:off x="381000" y="685800"/>
+            <a:ext cx="6096000" cy="3429000"/>
           </a:xfrm>
           <a:custGeom>
             <a:avLst/>
@@ -857,7 +858,7 @@
         </p:nvSpPr>
         <p:spPr>
           <a:xfrm>
-            <a:off x="381300" y="685800"/>
+            <a:off x="381000" y="685800"/>
             <a:ext cx="6096000" cy="3429000"/>
           </a:xfrm>
           <a:custGeom>
@@ -961,7 +962,7 @@
         </p:nvSpPr>
         <p:spPr>
           <a:xfrm>
-            <a:off x="381300" y="685800"/>
+            <a:off x="381000" y="685800"/>
             <a:ext cx="6096000" cy="3429000"/>
           </a:xfrm>
           <a:custGeom>
@@ -1169,7 +1170,7 @@
         </p:nvSpPr>
         <p:spPr>
           <a:xfrm>
-            <a:off x="381300" y="685800"/>
+            <a:off x="381000" y="685800"/>
             <a:ext cx="6096000" cy="3429000"/>
           </a:xfrm>
           <a:custGeom>
@@ -1377,7 +1378,7 @@
         </p:nvSpPr>
         <p:spPr>
           <a:xfrm>
-            <a:off x="381300" y="685800"/>
+            <a:off x="381000" y="685800"/>
             <a:ext cx="6096000" cy="3429000"/>
           </a:xfrm>
           <a:custGeom>
@@ -7605,10 +7606,10 @@
               <a:buNone/>
             </a:pPr>
             <a:r>
-              <a:rPr lang="en"/>
+              <a:rPr lang="en" dirty="0"/>
               <a:t>“Look at me!” --</a:t>
             </a:r>
-            <a:endParaRPr/>
+            <a:endParaRPr dirty="0"/>
           </a:p>
           <a:p>
             <a:pPr marL="0" lvl="0" indent="0" algn="l" rtl="0">
@@ -7621,10 +7622,10 @@
               <a:buNone/>
             </a:pPr>
             <a:r>
-              <a:rPr lang="en" sz="2100"/>
-              <a:t>An Creative Feminist Examination of the Female Body</a:t>
+              <a:rPr lang="en" sz="2100" dirty="0"/>
+              <a:t>An Creative Examination of the Female Body</a:t>
             </a:r>
-            <a:endParaRPr sz="2100"/>
+            <a:endParaRPr sz="2100" dirty="0"/>
           </a:p>
         </p:txBody>
       </p:sp>
@@ -7663,10 +7664,22 @@
               <a:buNone/>
             </a:pPr>
             <a:r>
-              <a:rPr lang="en"/>
-              <a:t>Jiayi Hao </a:t>
+              <a:rPr lang="en" dirty="0" err="1"/>
+              <a:t>Jiayi</a:t>
             </a:r>
-            <a:endParaRPr/>
+            <a:r>
+              <a:rPr lang="en" dirty="0"/>
+              <a:t> Hao </a:t>
+            </a:r>
+            <a:r>
+              <a:rPr lang="zh-CN" altLang="en-US" dirty="0"/>
+              <a:t> </a:t>
+            </a:r>
+            <a:r>
+              <a:rPr lang="en-US" altLang="zh-CN" dirty="0"/>
+              <a:t>24’</a:t>
+            </a:r>
+            <a:endParaRPr dirty="0"/>
           </a:p>
           <a:p>
             <a:pPr marL="0" lvl="0" indent="0" algn="l" rtl="0">
@@ -7679,10 +7692,14 @@
               <a:buNone/>
             </a:pPr>
             <a:r>
-              <a:rPr lang="en"/>
-              <a:t>Mediart 206 Midterm Presentation</a:t>
+              <a:rPr lang="en" dirty="0" err="1"/>
+              <a:t>Mediart</a:t>
             </a:r>
-            <a:endParaRPr/>
+            <a:r>
+              <a:rPr lang="en" dirty="0"/>
+              <a:t> 206 Midterm Presentation</a:t>
+            </a:r>
+            <a:endParaRPr dirty="0"/>
           </a:p>
         </p:txBody>
       </p:sp>
@@ -7723,7 +7740,7 @@
         </p:nvSpPr>
         <p:spPr>
           <a:xfrm>
-            <a:off x="2400250" y="575950"/>
+            <a:off x="550186" y="863028"/>
             <a:ext cx="6321600" cy="635400"/>
           </a:xfrm>
           <a:prstGeom prst="rect">
@@ -7746,10 +7763,10 @@
               <a:buNone/>
             </a:pPr>
             <a:r>
-              <a:rPr lang="en"/>
-              <a:t>Background: Our Bodies</a:t>
+              <a:rPr lang="en" dirty="0"/>
+              <a:t>Background: Bodies</a:t>
             </a:r>
-            <a:endParaRPr/>
+            <a:endParaRPr dirty="0"/>
           </a:p>
         </p:txBody>
       </p:sp>
@@ -7765,8 +7782,8 @@
         </p:nvSpPr>
         <p:spPr>
           <a:xfrm>
-            <a:off x="2410112" y="1595776"/>
-            <a:ext cx="6321600" cy="3002400"/>
+            <a:off x="422595" y="1703374"/>
+            <a:ext cx="8019656" cy="3002400"/>
           </a:xfrm>
           <a:prstGeom prst="rect">
             <a:avLst/>
@@ -7789,10 +7806,10 @@
               <a:buChar char="●"/>
             </a:pPr>
             <a:r>
-              <a:rPr lang="en" sz="2600"/>
+              <a:rPr lang="en" sz="2600" dirty="0"/>
               <a:t>Our bodies are more than physical, protective structures</a:t>
             </a:r>
-            <a:endParaRPr sz="2600"/>
+            <a:endParaRPr sz="2600" dirty="0"/>
           </a:p>
           <a:p>
             <a:pPr marL="457200" lvl="0" indent="-393700" algn="l" rtl="0">
@@ -7806,10 +7823,10 @@
               <a:buChar char="●"/>
             </a:pPr>
             <a:r>
-              <a:rPr lang="en" sz="2600"/>
+              <a:rPr lang="en" sz="2600" dirty="0"/>
               <a:t>Holds our identities and shapes our experiences</a:t>
             </a:r>
-            <a:endParaRPr sz="2600"/>
+            <a:endParaRPr sz="2600" dirty="0"/>
           </a:p>
           <a:p>
             <a:pPr marL="457200" lvl="0" indent="-393700" algn="l" rtl="0">
@@ -7823,10 +7840,10 @@
               <a:buChar char="●"/>
             </a:pPr>
             <a:r>
-              <a:rPr lang="en" sz="2600"/>
+              <a:rPr lang="en" sz="2600" dirty="0"/>
               <a:t>An integral part of the self -  what makes us “us”</a:t>
             </a:r>
-            <a:endParaRPr sz="2600"/>
+            <a:endParaRPr sz="2600" dirty="0"/>
           </a:p>
         </p:txBody>
       </p:sp>
@@ -7909,7 +7926,7 @@
         </p:nvSpPr>
         <p:spPr>
           <a:xfrm>
-            <a:off x="2400262" y="1334951"/>
+            <a:off x="2421527" y="1166241"/>
             <a:ext cx="6321600" cy="3002400"/>
           </a:xfrm>
           <a:prstGeom prst="rect">
@@ -7933,10 +7950,10 @@
               <a:buChar char="●"/>
             </a:pPr>
             <a:r>
-              <a:rPr lang="en" sz="2300"/>
+              <a:rPr lang="en" sz="2300" dirty="0"/>
               <a:t>In patriarchal societies, the female body is often objectified and being stared upon</a:t>
             </a:r>
-            <a:endParaRPr sz="2300"/>
+            <a:endParaRPr sz="2300" dirty="0"/>
           </a:p>
           <a:p>
             <a:pPr marL="457200" lvl="0" indent="-374650" algn="l" rtl="0">
@@ -7950,10 +7967,26 @@
               <a:buChar char="●"/>
             </a:pPr>
             <a:r>
-              <a:rPr lang="en" sz="2300"/>
-              <a:t>How others view  female-identifying individuals’ bodies is closely correlated to their lived and living experiences  </a:t>
+              <a:rPr lang="en" sz="2300" dirty="0"/>
+              <a:t>How others </a:t>
             </a:r>
-            <a:endParaRPr sz="2300"/>
+            <a:r>
+              <a:rPr lang="en-US" altLang="zh-CN" sz="2300" dirty="0"/>
+              <a:t>gaze</a:t>
+            </a:r>
+            <a:r>
+              <a:rPr lang="zh-CN" altLang="en-US" sz="2300" dirty="0"/>
+              <a:t> </a:t>
+            </a:r>
+            <a:r>
+              <a:rPr lang="en-US" altLang="zh-CN" sz="2300" dirty="0"/>
+              <a:t>upon</a:t>
+            </a:r>
+            <a:r>
+              <a:rPr lang="en" sz="2300" dirty="0"/>
+              <a:t>  female-identifying individuals’ bodies is closely correlated to their lived and living experiences  </a:t>
+            </a:r>
+            <a:endParaRPr sz="2300" dirty="0"/>
           </a:p>
           <a:p>
             <a:pPr marL="457200" lvl="0" indent="-374650" algn="l" rtl="0">
@@ -7967,10 +8000,10 @@
               <a:buChar char="●"/>
             </a:pPr>
             <a:r>
-              <a:rPr lang="en" sz="2300"/>
+              <a:rPr lang="en" sz="2300" dirty="0"/>
               <a:t>Body shaming, eating disorders etc. are more common in female-identifying individuals</a:t>
             </a:r>
-            <a:endParaRPr sz="2300"/>
+            <a:endParaRPr sz="2300" dirty="0"/>
           </a:p>
         </p:txBody>
       </p:sp>
@@ -8215,10 +8248,30 @@
               <a:buNone/>
             </a:pPr>
             <a:r>
-              <a:rPr lang="en"/>
+              <a:rPr lang="en" dirty="0"/>
+              <a:t>Space</a:t>
+            </a:r>
+            <a:r>
+              <a:rPr lang="en-US" altLang="zh-CN" dirty="0"/>
+              <a:t>s</a:t>
+            </a:r>
+            <a:r>
+              <a:rPr lang="zh-CN" altLang="en-US" dirty="0"/>
+              <a:t> </a:t>
+            </a:r>
+            <a:r>
+              <a:rPr lang="en-US" altLang="zh-CN" dirty="0"/>
+              <a:t>-</a:t>
+            </a:r>
+            <a:r>
+              <a:rPr lang="zh-CN" altLang="en-US" dirty="0"/>
+              <a:t> </a:t>
+            </a:r>
+            <a:r>
+              <a:rPr lang="en" dirty="0"/>
               <a:t>2 Dimensional Portrayal</a:t>
             </a:r>
-            <a:endParaRPr/>
+            <a:endParaRPr dirty="0"/>
           </a:p>
         </p:txBody>
       </p:sp>
@@ -8650,6 +8703,64 @@
               </a:rPr>
               <a:t>()</a:t>
             </a:r>
+          </a:p>
+          <a:p>
+            <a:pPr marL="0" lvl="0" indent="0" algn="l" rtl="0">
+              <a:spcBef>
+                <a:spcPts val="0"/>
+              </a:spcBef>
+              <a:spcAft>
+                <a:spcPts val="0"/>
+              </a:spcAft>
+              <a:buNone/>
+            </a:pPr>
+            <a:r>
+              <a:rPr lang="en-US" altLang="zh-CN" sz="2000" dirty="0">
+                <a:solidFill>
+                  <a:schemeClr val="dk1"/>
+                </a:solidFill>
+                <a:latin typeface="Lato"/>
+                <a:ea typeface="Lato"/>
+                <a:cs typeface="Lato"/>
+                <a:sym typeface="Lato"/>
+              </a:rPr>
+              <a:t>sin()</a:t>
+            </a:r>
+          </a:p>
+          <a:p>
+            <a:pPr marL="0" lvl="0" indent="0" algn="l" rtl="0">
+              <a:spcBef>
+                <a:spcPts val="0"/>
+              </a:spcBef>
+              <a:spcAft>
+                <a:spcPts val="0"/>
+              </a:spcAft>
+              <a:buNone/>
+            </a:pPr>
+            <a:r>
+              <a:rPr lang="en-US" altLang="zh-CN" sz="2000" dirty="0" err="1">
+                <a:solidFill>
+                  <a:schemeClr val="dk1"/>
+                </a:solidFill>
+                <a:latin typeface="Lato"/>
+                <a:ea typeface="Lato"/>
+                <a:cs typeface="Lato"/>
+                <a:sym typeface="Lato"/>
+              </a:rPr>
+              <a:t>MousePressed</a:t>
+            </a:r>
+            <a:r>
+              <a:rPr lang="en-US" altLang="zh-CN" sz="2000" dirty="0">
+                <a:solidFill>
+                  <a:schemeClr val="dk1"/>
+                </a:solidFill>
+                <a:latin typeface="Lato"/>
+                <a:ea typeface="Lato"/>
+                <a:cs typeface="Lato"/>
+                <a:sym typeface="Lato"/>
+              </a:rPr>
+              <a:t>()</a:t>
+            </a:r>
             <a:endParaRPr sz="2000" dirty="0">
               <a:solidFill>
                 <a:schemeClr val="dk1"/>
@@ -8794,10 +8905,26 @@
               <a:buNone/>
             </a:pPr>
             <a:r>
-              <a:rPr lang="en"/>
+              <a:rPr lang="en-US" altLang="zh-CN" dirty="0"/>
+              <a:t>Spaces</a:t>
+            </a:r>
+            <a:r>
+              <a:rPr lang="zh-CN" altLang="en-US" dirty="0"/>
+              <a:t> </a:t>
+            </a:r>
+            <a:r>
+              <a:rPr lang="en-US" altLang="zh-CN" dirty="0"/>
+              <a:t>-</a:t>
+            </a:r>
+            <a:r>
+              <a:rPr lang="zh-CN" altLang="en-US" dirty="0"/>
+              <a:t> </a:t>
+            </a:r>
+            <a:r>
+              <a:rPr lang="en" dirty="0"/>
               <a:t>3 Dimensional Portrayal</a:t>
             </a:r>
-            <a:endParaRPr/>
+            <a:endParaRPr dirty="0"/>
           </a:p>
         </p:txBody>
       </p:sp>
@@ -9219,10 +9346,22 @@
               <a:buNone/>
             </a:pPr>
             <a:r>
-              <a:rPr lang="en"/>
-              <a:t>3D Spirit: Individual liberation </a:t>
+              <a:rPr lang="en" dirty="0"/>
+              <a:t>3D Spirit: Meta</a:t>
             </a:r>
-            <a:endParaRPr/>
+            <a:r>
+              <a:rPr lang="en-US" altLang="zh-CN" dirty="0" err="1"/>
+              <a:t>phoriccal</a:t>
+            </a:r>
+            <a:r>
+              <a:rPr lang="zh-CN" altLang="en-US" dirty="0"/>
+              <a:t> </a:t>
+            </a:r>
+            <a:r>
+              <a:rPr lang="en" dirty="0"/>
+              <a:t>Individual liberation </a:t>
+            </a:r>
+            <a:endParaRPr dirty="0"/>
           </a:p>
         </p:txBody>
       </p:sp>
@@ -9289,6 +9428,107 @@
 </file>
 
 <file path=ppt/slides/slide8.xml><?xml version="1.0" encoding="utf-8"?>
+<p:sld xmlns:a="http://schemas.openxmlformats.org/drawingml/2006/main" xmlns:r="http://schemas.openxmlformats.org/officeDocument/2006/relationships" xmlns:p="http://schemas.openxmlformats.org/presentationml/2006/main">
+  <p:cSld>
+    <p:spTree>
+      <p:nvGrpSpPr>
+        <p:cNvPr id="1" name=""/>
+        <p:cNvGrpSpPr/>
+        <p:nvPr/>
+      </p:nvGrpSpPr>
+      <p:grpSpPr>
+        <a:xfrm>
+          <a:off x="0" y="0"/>
+          <a:ext cx="0" cy="0"/>
+          <a:chOff x="0" y="0"/>
+          <a:chExt cx="0" cy="0"/>
+        </a:xfrm>
+      </p:grpSpPr>
+      <p:sp>
+        <p:nvSpPr>
+          <p:cNvPr id="2" name="Title 1">
+            <a:extLst>
+              <a:ext uri="{FF2B5EF4-FFF2-40B4-BE49-F238E27FC236}">
+                <a16:creationId xmlns:a16="http://schemas.microsoft.com/office/drawing/2014/main" id="{8DF5F219-F083-0540-A470-EF91E4727494}"/>
+              </a:ext>
+            </a:extLst>
+          </p:cNvPr>
+          <p:cNvSpPr>
+            <a:spLocks noGrp="1"/>
+          </p:cNvSpPr>
+          <p:nvPr>
+            <p:ph type="title"/>
+          </p:nvPr>
+        </p:nvSpPr>
+        <p:spPr/>
+        <p:txBody>
+          <a:bodyPr/>
+          <a:lstStyle/>
+          <a:p>
+            <a:r>
+              <a:rPr lang="en-US" dirty="0"/>
+              <a:t>U</a:t>
+            </a:r>
+            <a:r>
+              <a:rPr lang="en-US" altLang="zh-CN" dirty="0"/>
+              <a:t>ser</a:t>
+            </a:r>
+            <a:r>
+              <a:rPr lang="zh-CN" altLang="en-US" dirty="0"/>
+              <a:t> </a:t>
+            </a:r>
+            <a:r>
+              <a:rPr lang="en-US" altLang="zh-CN" dirty="0"/>
+              <a:t>Instructions</a:t>
+            </a:r>
+            <a:endParaRPr lang="en-US" dirty="0"/>
+          </a:p>
+        </p:txBody>
+      </p:sp>
+      <p:pic>
+        <p:nvPicPr>
+          <p:cNvPr id="5" name="Picture 4" descr="A picture containing schematic&#10;&#10;Description automatically generated">
+            <a:extLst>
+              <a:ext uri="{FF2B5EF4-FFF2-40B4-BE49-F238E27FC236}">
+                <a16:creationId xmlns:a16="http://schemas.microsoft.com/office/drawing/2014/main" id="{60E6F374-39D6-144C-876D-EFCED3F9225A}"/>
+              </a:ext>
+            </a:extLst>
+          </p:cNvPr>
+          <p:cNvPicPr>
+            <a:picLocks noChangeAspect="1"/>
+          </p:cNvPicPr>
+          <p:nvPr/>
+        </p:nvPicPr>
+        <p:blipFill>
+          <a:blip r:embed="rId2"/>
+          <a:stretch>
+            <a:fillRect/>
+          </a:stretch>
+        </p:blipFill>
+        <p:spPr>
+          <a:xfrm>
+            <a:off x="303300" y="1827471"/>
+            <a:ext cx="8847083" cy="1488557"/>
+          </a:xfrm>
+          <a:prstGeom prst="rect">
+            <a:avLst/>
+          </a:prstGeom>
+        </p:spPr>
+      </p:pic>
+    </p:spTree>
+    <p:extLst>
+      <p:ext uri="{BB962C8B-B14F-4D97-AF65-F5344CB8AC3E}">
+        <p14:creationId xmlns:p14="http://schemas.microsoft.com/office/powerpoint/2010/main" val="2614771369"/>
+      </p:ext>
+    </p:extLst>
+  </p:cSld>
+  <p:clrMapOvr>
+    <a:masterClrMapping/>
+  </p:clrMapOvr>
+</p:sld>
+</file>
+
+<file path=ppt/slides/slide9.xml><?xml version="1.0" encoding="utf-8"?>
 <p:sld xmlns:a="http://schemas.openxmlformats.org/drawingml/2006/main" xmlns:r="http://schemas.openxmlformats.org/officeDocument/2006/relationships" xmlns:p="http://schemas.openxmlformats.org/presentationml/2006/main">
   <p:cSld>
     <p:spTree>

</xml_diff>